<commit_message>
text edit card: transmission of unencrypted data over an insecure channel
</commit_message>
<xml_diff>
--- a/cards-german.pptx
+++ b/cards-german.pptx
@@ -138,7 +138,7 @@
   </p:defaultTextStyle>
   <p:extLst>
     <p:ext uri="{EFAFB233-063F-42B5-8137-9DF3F51BA10A}">
-      <p15:sldGuideLst xmlns="" xmlns:p15="http://schemas.microsoft.com/office/powerpoint/2012/main">
+      <p15:sldGuideLst xmlns:p15="http://schemas.microsoft.com/office/powerpoint/2012/main">
         <p15:guide id="1" orient="horz" pos="2160">
           <p15:clr>
             <a:srgbClr val="A4A3A4"/>
@@ -238,7 +238,7 @@
             <a:fld id="{6149D158-25A6-4657-BC24-EF6AFA6AD927}" type="datetimeFigureOut">
               <a:rPr lang="de-DE" smtClean="0"/>
               <a:pPr/>
-              <a:t>20.05.2025</a:t>
+              <a:t>26.05.2025</a:t>
             </a:fld>
             <a:endParaRPr lang="de-DE"/>
           </a:p>
@@ -765,7 +765,7 @@
             <a:fld id="{270CC73C-A339-47C8-9CA0-F4AC11EC788F}" type="datetimeFigureOut">
               <a:rPr lang="de-DE" smtClean="0"/>
               <a:pPr/>
-              <a:t>20.05.2025</a:t>
+              <a:t>26.05.2025</a:t>
             </a:fld>
             <a:endParaRPr lang="de-DE"/>
           </a:p>
@@ -930,7 +930,7 @@
             <a:fld id="{270CC73C-A339-47C8-9CA0-F4AC11EC788F}" type="datetimeFigureOut">
               <a:rPr lang="de-DE" smtClean="0"/>
               <a:pPr/>
-              <a:t>20.05.2025</a:t>
+              <a:t>26.05.2025</a:t>
             </a:fld>
             <a:endParaRPr lang="de-DE"/>
           </a:p>
@@ -1105,7 +1105,7 @@
             <a:fld id="{270CC73C-A339-47C8-9CA0-F4AC11EC788F}" type="datetimeFigureOut">
               <a:rPr lang="de-DE" smtClean="0"/>
               <a:pPr/>
-              <a:t>20.05.2025</a:t>
+              <a:t>26.05.2025</a:t>
             </a:fld>
             <a:endParaRPr lang="de-DE"/>
           </a:p>
@@ -1270,7 +1270,7 @@
             <a:fld id="{270CC73C-A339-47C8-9CA0-F4AC11EC788F}" type="datetimeFigureOut">
               <a:rPr lang="de-DE" smtClean="0"/>
               <a:pPr/>
-              <a:t>20.05.2025</a:t>
+              <a:t>26.05.2025</a:t>
             </a:fld>
             <a:endParaRPr lang="de-DE"/>
           </a:p>
@@ -1512,7 +1512,7 @@
             <a:fld id="{270CC73C-A339-47C8-9CA0-F4AC11EC788F}" type="datetimeFigureOut">
               <a:rPr lang="de-DE" smtClean="0"/>
               <a:pPr/>
-              <a:t>20.05.2025</a:t>
+              <a:t>26.05.2025</a:t>
             </a:fld>
             <a:endParaRPr lang="de-DE"/>
           </a:p>
@@ -2222,7 +2222,7 @@
             <a:fld id="{270CC73C-A339-47C8-9CA0-F4AC11EC788F}" type="datetimeFigureOut">
               <a:rPr lang="de-DE" smtClean="0"/>
               <a:pPr/>
-              <a:t>20.05.2025</a:t>
+              <a:t>26.05.2025</a:t>
             </a:fld>
             <a:endParaRPr lang="de-DE"/>
           </a:p>
@@ -2336,7 +2336,7 @@
             <a:fld id="{270CC73C-A339-47C8-9CA0-F4AC11EC788F}" type="datetimeFigureOut">
               <a:rPr lang="de-DE" smtClean="0"/>
               <a:pPr/>
-              <a:t>20.05.2025</a:t>
+              <a:t>26.05.2025</a:t>
             </a:fld>
             <a:endParaRPr lang="de-DE"/>
           </a:p>
@@ -2428,7 +2428,7 @@
             <a:fld id="{270CC73C-A339-47C8-9CA0-F4AC11EC788F}" type="datetimeFigureOut">
               <a:rPr lang="de-DE" smtClean="0"/>
               <a:pPr/>
-              <a:t>20.05.2025</a:t>
+              <a:t>26.05.2025</a:t>
             </a:fld>
             <a:endParaRPr lang="de-DE"/>
           </a:p>
@@ -2700,7 +2700,7 @@
             <a:fld id="{270CC73C-A339-47C8-9CA0-F4AC11EC788F}" type="datetimeFigureOut">
               <a:rPr lang="de-DE" smtClean="0"/>
               <a:pPr/>
-              <a:t>20.05.2025</a:t>
+              <a:t>26.05.2025</a:t>
             </a:fld>
             <a:endParaRPr lang="de-DE"/>
           </a:p>
@@ -2949,7 +2949,7 @@
             <a:fld id="{270CC73C-A339-47C8-9CA0-F4AC11EC788F}" type="datetimeFigureOut">
               <a:rPr lang="de-DE" smtClean="0"/>
               <a:pPr/>
-              <a:t>20.05.2025</a:t>
+              <a:t>26.05.2025</a:t>
             </a:fld>
             <a:endParaRPr lang="de-DE"/>
           </a:p>
@@ -3157,7 +3157,7 @@
             <a:fld id="{270CC73C-A339-47C8-9CA0-F4AC11EC788F}" type="datetimeFigureOut">
               <a:rPr lang="de-DE" smtClean="0"/>
               <a:pPr/>
-              <a:t>20.05.2025</a:t>
+              <a:t>26.05.2025</a:t>
             </a:fld>
             <a:endParaRPr lang="de-DE"/>
           </a:p>
@@ -3578,33 +3578,16 @@
             <a:pPr marL="0" indent="0"/>
             <a:r>
               <a:rPr lang="de-DE" sz="1400" dirty="0"/>
-              <a:t>Quellen: Statistisches Bundesamt </a:t>
-            </a:r>
-            <a:r>
-              <a:rPr lang="de-DE" sz="1400" dirty="0" smtClean="0"/>
-              <a:t>(kurzlinks.de/0y0f) </a:t>
+              <a:t>Quellen: Statistisches Bundesamt (kurzlinks.de/0y0f) BAGSO (kurzlinks.de/</a:t>
+            </a:r>
+            <a:r>
+              <a:rPr lang="de-DE" sz="1400" dirty="0" err="1"/>
+              <a:t>tvox</a:t>
             </a:r>
             <a:r>
               <a:rPr lang="de-DE" sz="1400" dirty="0"/>
-              <a:t>BAGSO </a:t>
-            </a:r>
-            <a:r>
-              <a:rPr lang="de-DE" sz="1400" dirty="0" smtClean="0"/>
-              <a:t>(</a:t>
-            </a:r>
-            <a:r>
-              <a:rPr lang="de-DE" sz="1400" dirty="0" smtClean="0"/>
-              <a:t>kurzlinks.de/</a:t>
-            </a:r>
-            <a:r>
-              <a:rPr lang="de-DE" sz="1400" dirty="0" err="1" smtClean="0"/>
-              <a:t>tvox</a:t>
-            </a:r>
-            <a:r>
-              <a:rPr lang="de-DE" sz="1400" dirty="0" smtClean="0"/>
               <a:t>)</a:t>
             </a:r>
-            <a:endParaRPr lang="de-DE" sz="1400" dirty="0"/>
           </a:p>
           <a:p>
             <a:pPr marL="0" indent="0"/>
@@ -4509,15 +4492,7 @@
             <a:pPr marL="0" indent="0"/>
             <a:r>
               <a:rPr lang="de-DE" sz="1800" b="0" dirty="0"/>
-              <a:t>Sicherheitsvorfälle , bei denen Patientendaten in großem Stil offengelegt wurden,  </a:t>
-            </a:r>
-            <a:r>
-              <a:rPr lang="de-DE" sz="1800" b="0" dirty="0" smtClean="0"/>
-              <a:t>könnten es nahelegen, </a:t>
-            </a:r>
-            <a:r>
-              <a:rPr lang="de-DE" sz="1800" b="0" dirty="0"/>
-              <a:t>sich gegen die Nutzung der elektronischen Patientenakte zu entscheiden.</a:t>
+              <a:t>Sicherheitsvorfälle , bei denen Patientendaten in großem Stil offengelegt wurden,  könnten es nahelegen, sich gegen die Nutzung der elektronischen Patientenakte zu entscheiden.</a:t>
             </a:r>
             <a:br>
               <a:rPr lang="de-DE" sz="1800" b="0" dirty="0"/>
@@ -5137,43 +5112,19 @@
               <a:rPr lang="de-DE" sz="1800" dirty="0"/>
               <a:t>Beispiel:</a:t>
             </a:r>
-            <a:r>
-              <a:rPr lang="de-DE" sz="1800" b="0" dirty="0"/>
-              <a:t/>
-            </a:r>
             <a:br>
               <a:rPr lang="de-DE" sz="1800" b="0" dirty="0"/>
             </a:br>
             <a:r>
               <a:rPr lang="de-DE" sz="1800" b="0" dirty="0"/>
-              <a:t>Beim Fahrkartenkauf wird in der Bahn-App kein Länderticket angeboten, wenn die Fahrt 8:59 </a:t>
-            </a:r>
-            <a:r>
-              <a:rPr lang="de-DE" sz="1800" b="0" dirty="0" smtClean="0"/>
-              <a:t>beginnt, denn das </a:t>
-            </a:r>
-            <a:r>
-              <a:rPr lang="de-DE" sz="1800" b="0" dirty="0"/>
-              <a:t>Länderticket gilt erst ab 9 Uhr. Die kostengünstigste Variante ist es </a:t>
-            </a:r>
-            <a:r>
-              <a:rPr lang="de-DE" sz="1800" b="0" dirty="0" smtClean="0"/>
-              <a:t>aber </a:t>
-            </a:r>
-            <a:r>
-              <a:rPr lang="de-DE" sz="1800" b="0" dirty="0"/>
-              <a:t>oft, bis zur nächsten Station mit regulärem Fahrpreis, danach mit Länderticket zu reisen</a:t>
-            </a:r>
-            <a:r>
-              <a:rPr lang="de-DE" sz="1800" b="0" dirty="0" smtClean="0"/>
-              <a:t>. Dies ist im Regelsystem der </a:t>
-            </a:r>
-            <a:r>
-              <a:rPr lang="de-DE" sz="1800" b="0" dirty="0" err="1" smtClean="0"/>
+              <a:t>Beim Fahrkartenkauf wird in der Bahn-App kein Länderticket angeboten, wenn die Fahrt 8:59 beginnt, denn das Länderticket gilt erst ab 9 Uhr. Die kostengünstigste Variante ist es aber oft, bis zur nächsten Station mit regulärem Fahrpreis, danach mit Länderticket zu reisen. Dies ist im Regelsystem der </a:t>
+            </a:r>
+            <a:r>
+              <a:rPr lang="de-DE" sz="1800" b="0" dirty="0" err="1"/>
               <a:t>App</a:t>
             </a:r>
             <a:r>
-              <a:rPr lang="de-DE" sz="1800" b="0" smtClean="0"/>
+              <a:rPr lang="de-DE" sz="1800" b="0"/>
               <a:t> allerdings nicht vorgesehen.</a:t>
             </a:r>
             <a:endParaRPr lang="de-DE" sz="1800" dirty="0"/>
@@ -5237,7 +5188,7 @@
           <p:cNvPr id="7" name="Richtungspfeil 6">
             <a:extLst>
               <a:ext uri="{FF2B5EF4-FFF2-40B4-BE49-F238E27FC236}">
-                <a16:creationId xmlns="" xmlns:a16="http://schemas.microsoft.com/office/drawing/2014/main" id="{28615C8D-ED08-4791-81E1-FDA5589CE9EF}"/>
+                <a16:creationId xmlns:a16="http://schemas.microsoft.com/office/drawing/2014/main" id="{28615C8D-ED08-4791-81E1-FDA5589CE9EF}"/>
               </a:ext>
             </a:extLst>
           </p:cNvPr>
@@ -5290,7 +5241,7 @@
     </p:spTree>
     <p:extLst>
       <p:ext uri="{BB962C8B-B14F-4D97-AF65-F5344CB8AC3E}">
-        <p14:creationId xmlns="" xmlns:p14="http://schemas.microsoft.com/office/powerpoint/2010/main" val="1511308404"/>
+        <p14:creationId xmlns:p14="http://schemas.microsoft.com/office/powerpoint/2010/main" val="1511308404"/>
       </p:ext>
     </p:extLst>
   </p:cSld>
@@ -5519,7 +5470,7 @@
     </p:spTree>
     <p:extLst>
       <p:ext uri="{BB962C8B-B14F-4D97-AF65-F5344CB8AC3E}">
-        <p14:creationId xmlns="" xmlns:p14="http://schemas.microsoft.com/office/powerpoint/2010/main" val="2538407280"/>
+        <p14:creationId xmlns:p14="http://schemas.microsoft.com/office/powerpoint/2010/main" val="2538407280"/>
       </p:ext>
     </p:extLst>
   </p:cSld>
@@ -5572,11 +5523,11 @@
             <a:pPr marL="0" indent="0"/>
             <a:r>
               <a:rPr lang="de-DE" sz="1800" b="1" dirty="0"/>
-              <a:t>Eine Person möchte ein Angebot nicht nutzen, da </a:t>
+              <a:t>Eine Person möchte ein Angebot nicht nutzen, da eine </a:t>
             </a:r>
             <a:r>
               <a:rPr lang="de-DE" sz="1800" b="1"/>
-              <a:t>eine Anwendung Daten </a:t>
+              <a:t>Anwendung unverschlüsselt Daten </a:t>
             </a:r>
             <a:r>
               <a:rPr lang="de-DE" sz="1800" b="1" dirty="0"/>
@@ -5745,7 +5696,7 @@
     </p:spTree>
     <p:extLst>
       <p:ext uri="{BB962C8B-B14F-4D97-AF65-F5344CB8AC3E}">
-        <p14:creationId xmlns="" xmlns:p14="http://schemas.microsoft.com/office/powerpoint/2010/main" val="3924297014"/>
+        <p14:creationId xmlns:p14="http://schemas.microsoft.com/office/powerpoint/2010/main" val="3924297014"/>
       </p:ext>
     </p:extLst>
   </p:cSld>
@@ -5957,7 +5908,7 @@
     </p:spTree>
     <p:extLst>
       <p:ext uri="{BB962C8B-B14F-4D97-AF65-F5344CB8AC3E}">
-        <p14:creationId xmlns="" xmlns:p14="http://schemas.microsoft.com/office/powerpoint/2010/main" val="1090519777"/>
+        <p14:creationId xmlns:p14="http://schemas.microsoft.com/office/powerpoint/2010/main" val="1090519777"/>
       </p:ext>
     </p:extLst>
   </p:cSld>
@@ -6168,7 +6119,7 @@
     </p:spTree>
     <p:extLst>
       <p:ext uri="{BB962C8B-B14F-4D97-AF65-F5344CB8AC3E}">
-        <p14:creationId xmlns="" xmlns:p14="http://schemas.microsoft.com/office/powerpoint/2010/main" val="1263655958"/>
+        <p14:creationId xmlns:p14="http://schemas.microsoft.com/office/powerpoint/2010/main" val="1263655958"/>
       </p:ext>
     </p:extLst>
   </p:cSld>
@@ -6447,7 +6398,7 @@
     </p:spTree>
     <p:extLst>
       <p:ext uri="{BB962C8B-B14F-4D97-AF65-F5344CB8AC3E}">
-        <p14:creationId xmlns="" xmlns:p14="http://schemas.microsoft.com/office/powerpoint/2010/main" val="1998426391"/>
+        <p14:creationId xmlns:p14="http://schemas.microsoft.com/office/powerpoint/2010/main" val="1998426391"/>
       </p:ext>
     </p:extLst>
   </p:cSld>
@@ -6914,7 +6865,7 @@
     </p:spTree>
     <p:extLst>
       <p:ext uri="{BB962C8B-B14F-4D97-AF65-F5344CB8AC3E}">
-        <p14:creationId xmlns="" xmlns:p14="http://schemas.microsoft.com/office/powerpoint/2010/main" val="1286262649"/>
+        <p14:creationId xmlns:p14="http://schemas.microsoft.com/office/powerpoint/2010/main" val="1286262649"/>
       </p:ext>
     </p:extLst>
   </p:cSld>
@@ -7212,7 +7163,7 @@
     </p:spTree>
     <p:extLst>
       <p:ext uri="{BB962C8B-B14F-4D97-AF65-F5344CB8AC3E}">
-        <p14:creationId xmlns="" xmlns:p14="http://schemas.microsoft.com/office/powerpoint/2010/main" val="1998426391"/>
+        <p14:creationId xmlns:p14="http://schemas.microsoft.com/office/powerpoint/2010/main" val="1998426391"/>
       </p:ext>
     </p:extLst>
   </p:cSld>
@@ -7387,7 +7338,7 @@
     </p:spTree>
     <p:extLst>
       <p:ext uri="{BB962C8B-B14F-4D97-AF65-F5344CB8AC3E}">
-        <p14:creationId xmlns="" xmlns:p14="http://schemas.microsoft.com/office/powerpoint/2010/main" val="3924297014"/>
+        <p14:creationId xmlns:p14="http://schemas.microsoft.com/office/powerpoint/2010/main" val="3924297014"/>
       </p:ext>
     </p:extLst>
   </p:cSld>
@@ -7534,7 +7485,7 @@
     </p:spTree>
     <p:extLst>
       <p:ext uri="{BB962C8B-B14F-4D97-AF65-F5344CB8AC3E}">
-        <p14:creationId xmlns="" xmlns:p14="http://schemas.microsoft.com/office/powerpoint/2010/main" val="3924297014"/>
+        <p14:creationId xmlns:p14="http://schemas.microsoft.com/office/powerpoint/2010/main" val="3924297014"/>
       </p:ext>
     </p:extLst>
   </p:cSld>
@@ -7662,7 +7613,7 @@
     </p:spTree>
     <p:extLst>
       <p:ext uri="{BB962C8B-B14F-4D97-AF65-F5344CB8AC3E}">
-        <p14:creationId xmlns="" xmlns:p14="http://schemas.microsoft.com/office/powerpoint/2010/main" val="3924297014"/>
+        <p14:creationId xmlns:p14="http://schemas.microsoft.com/office/powerpoint/2010/main" val="3924297014"/>
       </p:ext>
     </p:extLst>
   </p:cSld>
@@ -7848,7 +7799,7 @@
     </p:spTree>
     <p:extLst>
       <p:ext uri="{BB962C8B-B14F-4D97-AF65-F5344CB8AC3E}">
-        <p14:creationId xmlns="" xmlns:p14="http://schemas.microsoft.com/office/powerpoint/2010/main" val="3924297014"/>
+        <p14:creationId xmlns:p14="http://schemas.microsoft.com/office/powerpoint/2010/main" val="3924297014"/>
       </p:ext>
     </p:extLst>
   </p:cSld>
@@ -8202,7 +8153,7 @@
     </p:spTree>
     <p:extLst>
       <p:ext uri="{BB962C8B-B14F-4D97-AF65-F5344CB8AC3E}">
-        <p14:creationId xmlns="" xmlns:p14="http://schemas.microsoft.com/office/powerpoint/2010/main" val="3924297014"/>
+        <p14:creationId xmlns:p14="http://schemas.microsoft.com/office/powerpoint/2010/main" val="3924297014"/>
       </p:ext>
     </p:extLst>
   </p:cSld>
@@ -8319,7 +8270,7 @@
     </p:spTree>
     <p:extLst>
       <p:ext uri="{BB962C8B-B14F-4D97-AF65-F5344CB8AC3E}">
-        <p14:creationId xmlns="" xmlns:p14="http://schemas.microsoft.com/office/powerpoint/2010/main" val="3924297014"/>
+        <p14:creationId xmlns:p14="http://schemas.microsoft.com/office/powerpoint/2010/main" val="3924297014"/>
       </p:ext>
     </p:extLst>
   </p:cSld>
@@ -8481,7 +8432,7 @@
     </p:spTree>
     <p:extLst>
       <p:ext uri="{BB962C8B-B14F-4D97-AF65-F5344CB8AC3E}">
-        <p14:creationId xmlns="" xmlns:p14="http://schemas.microsoft.com/office/powerpoint/2010/main" val="3924297014"/>
+        <p14:creationId xmlns:p14="http://schemas.microsoft.com/office/powerpoint/2010/main" val="3924297014"/>
       </p:ext>
     </p:extLst>
   </p:cSld>
@@ -8643,7 +8594,7 @@
     </p:spTree>
     <p:extLst>
       <p:ext uri="{BB962C8B-B14F-4D97-AF65-F5344CB8AC3E}">
-        <p14:creationId xmlns="" xmlns:p14="http://schemas.microsoft.com/office/powerpoint/2010/main" val="3924297014"/>
+        <p14:creationId xmlns:p14="http://schemas.microsoft.com/office/powerpoint/2010/main" val="3924297014"/>
       </p:ext>
     </p:extLst>
   </p:cSld>
@@ -8720,10 +8671,6 @@
               <a:rPr lang="de-DE" sz="1600" dirty="0" err="1"/>
               <a:t>Creditreform</a:t>
             </a:r>
-            <a:r>
-              <a:rPr lang="de-DE" sz="1600" dirty="0"/>
-              <a:t/>
-            </a:r>
             <a:br>
               <a:rPr lang="de-DE" sz="1600" dirty="0"/>
             </a:br>
@@ -9029,7 +8976,7 @@
     </p:spTree>
     <p:extLst>
       <p:ext uri="{BB962C8B-B14F-4D97-AF65-F5344CB8AC3E}">
-        <p14:creationId xmlns="" xmlns:p14="http://schemas.microsoft.com/office/powerpoint/2010/main" val="3924297014"/>
+        <p14:creationId xmlns:p14="http://schemas.microsoft.com/office/powerpoint/2010/main" val="3924297014"/>
       </p:ext>
     </p:extLst>
   </p:cSld>
@@ -9081,78 +9028,48 @@
           <a:p>
             <a:pPr marL="0" indent="0"/>
             <a:r>
-              <a:rPr lang="de-DE" sz="1800" b="1" noProof="1" smtClean="0"/>
+              <a:rPr lang="de-DE" sz="1800" b="1" noProof="1"/>
               <a:t>Eine Person kann ein Angebot nicht wie vorgesehen nutzen, da ihr das Wissen darüber fehlt, wie digitale Technologien effektiv und sicher zu nutzen sind.</a:t>
             </a:r>
           </a:p>
           <a:p>
             <a:pPr marL="0" indent="0"/>
-            <a:endParaRPr lang="de-DE" sz="1800" noProof="1" smtClean="0"/>
-          </a:p>
-          <a:p>
-            <a:pPr marL="0" indent="0"/>
-            <a:r>
-              <a:rPr lang="de-DE" sz="1800" noProof="1" smtClean="0"/>
-              <a:t>Nur 49 % der Deutschen verfügen über die notwendigen digitalen </a:t>
-            </a:r>
-            <a:r>
-              <a:rPr lang="de-DE" sz="1800" noProof="1" smtClean="0"/>
-              <a:t>Basiskompetenzen.</a:t>
-            </a:r>
-            <a:r>
-              <a:rPr lang="de-DE" sz="1800" noProof="1" smtClean="0"/>
-              <a:t/>
+            <a:endParaRPr lang="de-DE" sz="1800" noProof="1"/>
+          </a:p>
+          <a:p>
+            <a:pPr marL="0" indent="0"/>
+            <a:r>
+              <a:rPr lang="de-DE" sz="1800" noProof="1"/>
+              <a:t>Nur 49 % der Deutschen verfügen über die notwendigen digitalen Basiskompetenzen.</a:t>
             </a:r>
             <a:br>
-              <a:rPr lang="de-DE" sz="1800" noProof="1" smtClean="0"/>
+              <a:rPr lang="de-DE" sz="1800" noProof="1"/>
             </a:br>
             <a:r>
-              <a:rPr lang="de-DE" sz="1800" noProof="1" smtClean="0"/>
+              <a:rPr lang="de-DE" sz="1800" noProof="1"/>
               <a:t>Beispiel: Nur 58 % der Deutschen trauen sich zu, verdächtige E-Mails zu erkennen. Tatsächlich erkannten in einem Experiment mit Phishing-Mails nur 57 % der Befragten einen Betrugsversuch.</a:t>
             </a:r>
-            <a:r>
-              <a:rPr lang="de-DE" sz="1800" noProof="1" smtClean="0"/>
-              <a:t/>
-            </a:r>
             <a:br>
-              <a:rPr lang="de-DE" sz="1800" noProof="1" smtClean="0"/>
+              <a:rPr lang="de-DE" sz="1800" noProof="1"/>
             </a:br>
             <a:r>
-              <a:rPr lang="de-DE" sz="1600" noProof="1" smtClean="0"/>
-              <a:t>Quelle</a:t>
-            </a:r>
-            <a:r>
-              <a:rPr lang="de-DE" sz="1600" noProof="1" smtClean="0"/>
-              <a:t>: D-21-Digital-Index 2024/25 / Erhebung des Bundesverbandes der Verbraucherzentralen von </a:t>
-            </a:r>
-            <a:r>
-              <a:rPr lang="de-DE" sz="1600" noProof="1" smtClean="0"/>
-              <a:t>2024)</a:t>
-            </a:r>
-            <a:endParaRPr lang="de-DE" sz="1600" noProof="1" smtClean="0"/>
-          </a:p>
-          <a:p>
-            <a:pPr marL="0" indent="0"/>
-            <a:r>
-              <a:rPr lang="de-DE" sz="1600" noProof="1" smtClean="0"/>
-              <a:t>(</a:t>
-            </a:r>
-            <a:r>
-              <a:rPr lang="de-DE" sz="1600" noProof="1" smtClean="0"/>
-              <a:t>kurzlinks.de/agpg ; </a:t>
-            </a:r>
-            <a:r>
-              <a:rPr lang="de-DE" sz="1600" noProof="1" smtClean="0"/>
-              <a:t>kurzlinks.de/hwhp)</a:t>
-            </a:r>
-            <a:endParaRPr lang="de-DE" sz="1600" noProof="1" smtClean="0"/>
-          </a:p>
-          <a:p>
-            <a:pPr marL="0" indent="0"/>
-            <a:endParaRPr lang="de-DE" sz="1800" noProof="1" smtClean="0"/>
-          </a:p>
-          <a:p>
-            <a:endParaRPr lang="de-DE" sz="1800" noProof="1" smtClean="0"/>
+              <a:rPr lang="de-DE" sz="1600" noProof="1"/>
+              <a:t>Quelle: D-21-Digital-Index 2024/25 / Erhebung des Bundesverbandes der Verbraucherzentralen von 2024)</a:t>
+            </a:r>
+          </a:p>
+          <a:p>
+            <a:pPr marL="0" indent="0"/>
+            <a:r>
+              <a:rPr lang="de-DE" sz="1600" noProof="1"/>
+              <a:t>(kurzlinks.de/agpg ; kurzlinks.de/hwhp)</a:t>
+            </a:r>
+          </a:p>
+          <a:p>
+            <a:pPr marL="0" indent="0"/>
+            <a:endParaRPr lang="de-DE" sz="1800" noProof="1"/>
+          </a:p>
+          <a:p>
+            <a:endParaRPr lang="de-DE" sz="1800" noProof="1"/>
           </a:p>
           <a:p>
             <a:pPr marL="0" indent="0"/>
@@ -9184,58 +9101,24 @@
           <a:lstStyle/>
           <a:p>
             <a:r>
-              <a:rPr lang="de-DE" sz="1800" noProof="1" smtClean="0"/>
+              <a:rPr lang="de-DE" sz="1800" noProof="1"/>
               <a:t>§§§:</a:t>
             </a:r>
-            <a:endParaRPr lang="de-DE" sz="1800" b="0" noProof="1" smtClean="0"/>
-          </a:p>
-          <a:p>
-            <a:pPr marL="0" indent="0"/>
-            <a:r>
-              <a:rPr lang="de-DE" sz="1800" b="0" noProof="1" smtClean="0"/>
-              <a:t>Das Finanzgericht Berlin-Brandenburg </a:t>
-            </a:r>
-            <a:r>
-              <a:rPr lang="de-DE" sz="1800" b="0" noProof="1" smtClean="0"/>
-              <a:t>urteilte</a:t>
-            </a:r>
-            <a:r>
-              <a:rPr lang="de-DE" sz="1800" b="0" noProof="1" smtClean="0"/>
-              <a:t>, dass die elektronische Abgabe der Steuererklärung für einen 64jährigen </a:t>
-            </a:r>
-            <a:r>
-              <a:rPr lang="de-DE" sz="1800" b="0" noProof="1" smtClean="0"/>
-              <a:t>Landwirt</a:t>
-            </a:r>
-            <a:r>
-              <a:rPr lang="de-DE" sz="1800" b="0" noProof="1" smtClean="0"/>
-              <a:t>, der nicht mit Computern umgehen </a:t>
-            </a:r>
-            <a:r>
-              <a:rPr lang="de-DE" sz="1800" b="0" noProof="1" smtClean="0"/>
-              <a:t>kann</a:t>
-            </a:r>
-            <a:r>
-              <a:rPr lang="de-DE" sz="1800" b="0" noProof="1" smtClean="0"/>
-              <a:t>, unzumutbar </a:t>
-            </a:r>
-            <a:r>
-              <a:rPr lang="de-DE" sz="1800" b="0" noProof="1" smtClean="0"/>
-              <a:t>ist.</a:t>
-            </a:r>
-            <a:endParaRPr lang="de-DE" sz="1800" b="0" noProof="1" smtClean="0"/>
-          </a:p>
-          <a:p>
-            <a:pPr marL="0" indent="0"/>
-            <a:r>
-              <a:rPr lang="de-DE" sz="1600" b="0" noProof="1" smtClean="0"/>
-              <a:t>FG Berlin-Brandenburg 14.02.2018 – 3 K 3249/17 </a:t>
-            </a:r>
-            <a:r>
-              <a:rPr lang="de-DE" sz="1600" b="0" noProof="1" smtClean="0"/>
-              <a:t>(kurzlinks.de/f5ze)</a:t>
-            </a:r>
-            <a:endParaRPr lang="de-DE" sz="1600" b="0" noProof="1" smtClean="0"/>
+            <a:endParaRPr lang="de-DE" sz="1800" b="0" noProof="1"/>
+          </a:p>
+          <a:p>
+            <a:pPr marL="0" indent="0"/>
+            <a:r>
+              <a:rPr lang="de-DE" sz="1800" b="0" noProof="1"/>
+              <a:t>Das Finanzgericht Berlin-Brandenburg urteilte, dass die elektronische Abgabe der Steuererklärung für einen 64jährigen Landwirt, der nicht mit Computern umgehen kann, unzumutbar ist.</a:t>
+            </a:r>
+          </a:p>
+          <a:p>
+            <a:pPr marL="0" indent="0"/>
+            <a:r>
+              <a:rPr lang="de-DE" sz="1600" b="0" noProof="1"/>
+              <a:t>FG Berlin-Brandenburg 14.02.2018 – 3 K 3249/17 (kurzlinks.de/f5ze)</a:t>
+            </a:r>
           </a:p>
           <a:p>
             <a:endParaRPr lang="de-DE" sz="1800" noProof="1"/>
@@ -9266,121 +9149,37 @@
           <a:lstStyle/>
           <a:p>
             <a:r>
-              <a:rPr lang="de-DE" sz="1800" noProof="1" smtClean="0"/>
+              <a:rPr lang="de-DE" sz="1800" noProof="1"/>
               <a:t>Beispiel:</a:t>
             </a:r>
-            <a:endParaRPr lang="de-DE" sz="1800" noProof="1" smtClean="0"/>
-          </a:p>
-          <a:p>
-            <a:pPr marL="0" indent="0"/>
-            <a:r>
-              <a:rPr lang="de-DE" sz="1800" b="0" noProof="1" smtClean="0"/>
-              <a:t>Aus einem Interview mit dem Vorstand der Deutschen Stiftung Patientenschutz zur elektronischen </a:t>
-            </a:r>
-            <a:r>
-              <a:rPr lang="de-DE" sz="1800" b="0" noProof="1" smtClean="0"/>
-              <a:t>Patientenakte:</a:t>
-            </a:r>
-            <a:endParaRPr lang="de-DE" sz="1800" b="0" noProof="1" smtClean="0"/>
-          </a:p>
-          <a:p>
-            <a:pPr marL="0" indent="0"/>
-            <a:r>
-              <a:rPr lang="de-DE" sz="1800" b="0" noProof="1" smtClean="0"/>
-              <a:t>Frage</a:t>
-            </a:r>
-            <a:r>
-              <a:rPr lang="de-DE" sz="1800" b="0" noProof="1" smtClean="0"/>
-              <a:t>: Jetzt auch noch eine App für die Steuerung der elektronischen </a:t>
-            </a:r>
-            <a:r>
-              <a:rPr lang="de-DE" sz="1800" b="0" noProof="1" smtClean="0"/>
-              <a:t>Krankenakte</a:t>
-            </a:r>
-            <a:r>
-              <a:rPr lang="de-DE" sz="1800" b="0" noProof="1" smtClean="0"/>
-              <a:t>, das Freigeben von Daten und so </a:t>
-            </a:r>
-            <a:r>
-              <a:rPr lang="de-DE" sz="1800" b="0" noProof="1" smtClean="0"/>
-              <a:t>weiter</a:t>
-            </a:r>
-            <a:r>
-              <a:rPr lang="de-DE" sz="1800" b="0" noProof="1" smtClean="0"/>
-              <a:t>. Geht das </a:t>
-            </a:r>
-            <a:r>
-              <a:rPr lang="de-DE" sz="1800" b="0" noProof="1" smtClean="0"/>
-              <a:t>gut?</a:t>
-            </a:r>
-            <a:endParaRPr lang="de-DE" sz="1800" b="0" noProof="1" smtClean="0"/>
-          </a:p>
-          <a:p>
-            <a:pPr marL="0" indent="0"/>
-            <a:r>
-              <a:rPr lang="de-DE" sz="1800" b="0" noProof="1" smtClean="0"/>
-              <a:t>Antwort</a:t>
-            </a:r>
-            <a:r>
-              <a:rPr lang="de-DE" sz="1800" b="0" noProof="1" smtClean="0"/>
-              <a:t>: … genau das hab ich dem Minister auch </a:t>
-            </a:r>
-            <a:r>
-              <a:rPr lang="de-DE" sz="1800" b="0" noProof="1" smtClean="0"/>
-              <a:t>gesagt</a:t>
-            </a:r>
-            <a:r>
-              <a:rPr lang="de-DE" sz="1800" b="0" noProof="1" smtClean="0"/>
-              <a:t>. Wir müssen auch diejenigen </a:t>
-            </a:r>
-            <a:r>
-              <a:rPr lang="de-DE" sz="1800" b="0" noProof="1" smtClean="0"/>
-              <a:t>mitnehmen</a:t>
-            </a:r>
-            <a:r>
-              <a:rPr lang="de-DE" sz="1800" b="0" noProof="1" smtClean="0"/>
-              <a:t>, die so etwas gar nicht bedienen </a:t>
-            </a:r>
-            <a:r>
-              <a:rPr lang="de-DE" sz="1800" b="0" noProof="1" smtClean="0"/>
-              <a:t>können</a:t>
-            </a:r>
-            <a:r>
-              <a:rPr lang="de-DE" sz="1800" b="0" noProof="1" smtClean="0"/>
-              <a:t>. Aber dazu gibt's keine Antwort des </a:t>
-            </a:r>
-            <a:r>
-              <a:rPr lang="de-DE" sz="1800" b="0" noProof="1" smtClean="0"/>
-              <a:t>Ministers</a:t>
-            </a:r>
-            <a:r>
-              <a:rPr lang="de-DE" sz="1800" b="0" noProof="1" smtClean="0"/>
-              <a:t>. Und er </a:t>
-            </a:r>
-            <a:r>
-              <a:rPr lang="de-DE" sz="1800" b="0" noProof="1" smtClean="0"/>
-              <a:t>sagt</a:t>
-            </a:r>
-            <a:r>
-              <a:rPr lang="de-DE" sz="1800" b="0" noProof="1" smtClean="0"/>
-              <a:t>: Das sollen dann Verwandte und Angehörige </a:t>
-            </a:r>
-            <a:r>
-              <a:rPr lang="de-DE" sz="1800" b="0" noProof="1" smtClean="0"/>
-              <a:t>machen.</a:t>
-            </a:r>
-            <a:r>
-              <a:rPr lang="de-DE" sz="1800" b="0" noProof="1" smtClean="0"/>
-              <a:t/>
+          </a:p>
+          <a:p>
+            <a:pPr marL="0" indent="0"/>
+            <a:r>
+              <a:rPr lang="de-DE" sz="1800" b="0" noProof="1"/>
+              <a:t>Aus einem Interview mit dem Vorstand der Deutschen Stiftung Patientenschutz zur elektronischen Patientenakte:</a:t>
+            </a:r>
+          </a:p>
+          <a:p>
+            <a:pPr marL="0" indent="0"/>
+            <a:r>
+              <a:rPr lang="de-DE" sz="1800" b="0" noProof="1"/>
+              <a:t>Frage: Jetzt auch noch eine App für die Steuerung der elektronischen Krankenakte, das Freigeben von Daten und so weiter. Geht das gut?</a:t>
+            </a:r>
+          </a:p>
+          <a:p>
+            <a:pPr marL="0" indent="0"/>
+            <a:r>
+              <a:rPr lang="de-DE" sz="1800" b="0" noProof="1"/>
+              <a:t>Antwort: … genau das hab ich dem Minister auch gesagt. Wir müssen auch diejenigen mitnehmen, die so etwas gar nicht bedienen können. Aber dazu gibt's keine Antwort des Ministers. Und er sagt: Das sollen dann Verwandte und Angehörige machen.</a:t>
             </a:r>
             <a:br>
-              <a:rPr lang="de-DE" sz="1800" b="0" noProof="1" smtClean="0"/>
+              <a:rPr lang="de-DE" sz="1800" b="0" noProof="1"/>
             </a:br>
             <a:r>
-              <a:rPr lang="de-DE" sz="1800" b="0" noProof="1" smtClean="0"/>
+              <a:rPr lang="de-DE" sz="1800" b="0" noProof="1"/>
               <a:t>(Quelle: SWR aktuell, https://kurzlinks.de/yyg6)</a:t>
             </a:r>
-            <a:endParaRPr lang="de-DE" sz="1800" b="0" noProof="1" smtClean="0"/>
           </a:p>
         </p:txBody>
       </p:sp>
@@ -9427,10 +9226,9 @@
           <a:p>
             <a:pPr algn="ctr"/>
             <a:r>
-              <a:rPr lang="de-DE" sz="2400" noProof="1" smtClean="0"/>
+              <a:rPr lang="de-DE" sz="2400" noProof="1"/>
               <a:t>A</a:t>
             </a:r>
-            <a:endParaRPr lang="de-DE" sz="2400" noProof="1"/>
           </a:p>
         </p:txBody>
       </p:sp>
@@ -10511,51 +10309,30 @@
             <a:pPr marL="0" indent="0"/>
             <a:r>
               <a:rPr lang="de-DE" sz="1800" dirty="0"/>
-              <a:t>Für den Hausbriefkasten ist das geltendes Recht. Die Nutzung eines elektronischen Briefkastens kann dazu führen, dass auch dieser täglich geöffnet werden muss, um juristische Fristen nicht zu versäumen</a:t>
-            </a:r>
-            <a:r>
-              <a:rPr lang="de-DE" sz="1800" dirty="0" smtClean="0"/>
-              <a:t>.</a:t>
-            </a:r>
-          </a:p>
-          <a:p>
-            <a:pPr marL="0" indent="0"/>
-            <a:r>
-              <a:rPr lang="de-DE" sz="1800" dirty="0" smtClean="0"/>
+              <a:t>Für den Hausbriefkasten ist das geltendes Recht. Die Nutzung eines elektronischen Briefkastens kann dazu führen, dass auch dieser täglich geöffnet werden muss, um juristische Fristen nicht zu versäumen.</a:t>
+            </a:r>
+          </a:p>
+          <a:p>
+            <a:pPr marL="0" indent="0"/>
+            <a:r>
+              <a:rPr lang="de-DE" sz="1800" dirty="0"/>
               <a:t>Immerhin 10,8 % der befragten E-Mail-Postfachinhaber gab in einer Umfrage an, den Postfachinhalt nicht täglich zu prüfen.</a:t>
             </a:r>
           </a:p>
           <a:p>
             <a:pPr marL="0" indent="0"/>
             <a:r>
-              <a:rPr lang="de-DE" sz="1600" dirty="0" smtClean="0"/>
-              <a:t>(Quelle</a:t>
-            </a:r>
-            <a:r>
-              <a:rPr lang="de-DE" sz="1600" dirty="0" smtClean="0"/>
-              <a:t>: </a:t>
-            </a:r>
-            <a:r>
-              <a:rPr lang="de-DE" sz="1600" dirty="0" smtClean="0"/>
-              <a:t>Umfrage des Verbands </a:t>
-            </a:r>
-            <a:r>
-              <a:rPr lang="de-DE" sz="1600" dirty="0" smtClean="0"/>
-              <a:t>der Internetwirtschaft e.V</a:t>
-            </a:r>
-            <a:r>
-              <a:rPr lang="de-DE" sz="1600" dirty="0" smtClean="0"/>
-              <a:t>.;  kurzlinks.de/</a:t>
-            </a:r>
-            <a:r>
-              <a:rPr lang="de-DE" sz="1600" dirty="0" err="1" smtClean="0"/>
+              <a:rPr lang="de-DE" sz="1600" dirty="0"/>
+              <a:t>(Quelle: Umfrage des Verbands der Internetwirtschaft e.V.;  kurzlinks.de/</a:t>
+            </a:r>
+            <a:r>
+              <a:rPr lang="de-DE" sz="1600" dirty="0" err="1"/>
               <a:t>nyry</a:t>
             </a:r>
             <a:r>
-              <a:rPr lang="de-DE" sz="1600" dirty="0" smtClean="0"/>
+              <a:rPr lang="de-DE" sz="1600" dirty="0"/>
               <a:t>)</a:t>
             </a:r>
-            <a:endParaRPr lang="de-DE" sz="1600" dirty="0"/>
           </a:p>
           <a:p>
             <a:pPr marL="0" indent="0"/>

</xml_diff>